<commit_message>
Actualización de la clase 18
</commit_message>
<xml_diff>
--- a/Clase 18/Clase 18.pptx
+++ b/Clase 18/Clase 18.pptx
@@ -7,7 +7,7 @@
     <p:sldMasterId id="2147483653" r:id="rId3"/>
   </p:sldMasterIdLst>
   <p:notesMasterIdLst>
-    <p:notesMasterId r:id="rId41"/>
+    <p:notesMasterId r:id="rId40"/>
   </p:notesMasterIdLst>
   <p:sldIdLst>
     <p:sldId id="256" r:id="rId4"/>
@@ -41,12 +41,11 @@
     <p:sldId id="371" r:id="rId32"/>
     <p:sldId id="372" r:id="rId33"/>
     <p:sldId id="373" r:id="rId34"/>
-    <p:sldId id="374" r:id="rId35"/>
-    <p:sldId id="375" r:id="rId36"/>
-    <p:sldId id="376" r:id="rId37"/>
-    <p:sldId id="377" r:id="rId38"/>
-    <p:sldId id="378" r:id="rId39"/>
-    <p:sldId id="262" r:id="rId40"/>
+    <p:sldId id="375" r:id="rId35"/>
+    <p:sldId id="376" r:id="rId36"/>
+    <p:sldId id="377" r:id="rId37"/>
+    <p:sldId id="378" r:id="rId38"/>
+    <p:sldId id="262" r:id="rId39"/>
   </p:sldIdLst>
   <p:sldSz cx="9144000" cy="5143500" type="screen16x9"/>
   <p:notesSz cx="6858000" cy="9144000"/>
@@ -2608,7 +2607,7 @@
     </p:spTree>
     <p:extLst>
       <p:ext uri="{BB962C8B-B14F-4D97-AF65-F5344CB8AC3E}">
-        <p14:creationId xmlns:p14="http://schemas.microsoft.com/office/powerpoint/2010/main" val="1730976806"/>
+        <p14:creationId xmlns:p14="http://schemas.microsoft.com/office/powerpoint/2010/main" val="3467569813"/>
       </p:ext>
     </p:extLst>
   </p:cSld>
@@ -2692,7 +2691,7 @@
     </p:spTree>
     <p:extLst>
       <p:ext uri="{BB962C8B-B14F-4D97-AF65-F5344CB8AC3E}">
-        <p14:creationId xmlns:p14="http://schemas.microsoft.com/office/powerpoint/2010/main" val="3467569813"/>
+        <p14:creationId xmlns:p14="http://schemas.microsoft.com/office/powerpoint/2010/main" val="3927269056"/>
       </p:ext>
     </p:extLst>
   </p:cSld>
@@ -2776,7 +2775,7 @@
     </p:spTree>
     <p:extLst>
       <p:ext uri="{BB962C8B-B14F-4D97-AF65-F5344CB8AC3E}">
-        <p14:creationId xmlns:p14="http://schemas.microsoft.com/office/powerpoint/2010/main" val="3927269056"/>
+        <p14:creationId xmlns:p14="http://schemas.microsoft.com/office/powerpoint/2010/main" val="1579616025"/>
       </p:ext>
     </p:extLst>
   </p:cSld>
@@ -2852,90 +2851,6 @@
             <a:fld id="{89EDC514-9E28-441F-BF04-3DE8912E9F4E}" type="slidenum">
               <a:rPr lang="en-US" smtClean="0"/>
               <a:t>35</a:t>
-            </a:fld>
-            <a:endParaRPr lang="en-US"/>
-          </a:p>
-        </p:txBody>
-      </p:sp>
-    </p:spTree>
-    <p:extLst>
-      <p:ext uri="{BB962C8B-B14F-4D97-AF65-F5344CB8AC3E}">
-        <p14:creationId xmlns:p14="http://schemas.microsoft.com/office/powerpoint/2010/main" val="1579616025"/>
-      </p:ext>
-    </p:extLst>
-  </p:cSld>
-  <p:clrMapOvr>
-    <a:masterClrMapping/>
-  </p:clrMapOvr>
-</p:notes>
-</file>
-
-<file path=ppt/notesSlides/notesSlide35.xml><?xml version="1.0" encoding="utf-8"?>
-<p:notes xmlns:a="http://schemas.openxmlformats.org/drawingml/2006/main" xmlns:r="http://schemas.openxmlformats.org/officeDocument/2006/relationships" xmlns:p="http://schemas.openxmlformats.org/presentationml/2006/main">
-  <p:cSld>
-    <p:spTree>
-      <p:nvGrpSpPr>
-        <p:cNvPr id="1" name=""/>
-        <p:cNvGrpSpPr/>
-        <p:nvPr/>
-      </p:nvGrpSpPr>
-      <p:grpSpPr>
-        <a:xfrm>
-          <a:off x="0" y="0"/>
-          <a:ext cx="0" cy="0"/>
-          <a:chOff x="0" y="0"/>
-          <a:chExt cx="0" cy="0"/>
-        </a:xfrm>
-      </p:grpSpPr>
-      <p:sp>
-        <p:nvSpPr>
-          <p:cNvPr id="2" name="Marcador de imagen de diapositiva 1"/>
-          <p:cNvSpPr>
-            <a:spLocks noGrp="1" noRot="1" noChangeAspect="1"/>
-          </p:cNvSpPr>
-          <p:nvPr>
-            <p:ph type="sldImg"/>
-          </p:nvPr>
-        </p:nvSpPr>
-        <p:spPr/>
-      </p:sp>
-      <p:sp>
-        <p:nvSpPr>
-          <p:cNvPr id="3" name="Marcador de notas 2"/>
-          <p:cNvSpPr>
-            <a:spLocks noGrp="1"/>
-          </p:cNvSpPr>
-          <p:nvPr>
-            <p:ph type="body" idx="1"/>
-          </p:nvPr>
-        </p:nvSpPr>
-        <p:spPr/>
-        <p:txBody>
-          <a:bodyPr/>
-          <a:lstStyle/>
-          <a:p>
-            <a:endParaRPr lang="es-ES" dirty="0"/>
-          </a:p>
-        </p:txBody>
-      </p:sp>
-      <p:sp>
-        <p:nvSpPr>
-          <p:cNvPr id="4" name="Marcador de número de diapositiva 3"/>
-          <p:cNvSpPr>
-            <a:spLocks noGrp="1"/>
-          </p:cNvSpPr>
-          <p:nvPr>
-            <p:ph type="sldNum" sz="quarter" idx="5"/>
-          </p:nvPr>
-        </p:nvSpPr>
-        <p:spPr/>
-        <p:txBody>
-          <a:bodyPr/>
-          <a:lstStyle/>
-          <a:p>
-            <a:fld id="{89EDC514-9E28-441F-BF04-3DE8912E9F4E}" type="slidenum">
-              <a:rPr lang="en-US" smtClean="0"/>
-              <a:t>36</a:t>
             </a:fld>
             <a:endParaRPr lang="en-US"/>
           </a:p>
@@ -12892,19 +12807,7 @@
                 </a:solidFill>
                 <a:cs typeface="Times New Roman" panose="02020603050405020304" pitchFamily="18" charset="0"/>
               </a:rPr>
-              <a:t>Cómo </a:t>
-            </a:r>
-            <a:r>
-              <a:rPr lang="en-US" altLang="ko-KR" dirty="0" smtClean="0">
-                <a:solidFill>
-                  <a:schemeClr val="tx1">
-                    <a:lumMod val="75000"/>
-                    <a:lumOff val="25000"/>
-                  </a:schemeClr>
-                </a:solidFill>
-                <a:cs typeface="Times New Roman" panose="02020603050405020304" pitchFamily="18" charset="0"/>
-              </a:rPr>
-              <a:t>crear </a:t>
+              <a:t>Cómo crear </a:t>
             </a:r>
             <a:r>
               <a:rPr lang="en-US" altLang="ko-KR" dirty="0" err="1" smtClean="0">
@@ -15052,7 +14955,6 @@
               <a:rPr lang="es-ES" dirty="0"/>
               <a:t>a ver el estado</a:t>
             </a:r>
-            <a:endParaRPr lang="es-ES" dirty="0"/>
           </a:p>
         </p:txBody>
       </p:sp>
@@ -16335,7 +16237,7 @@
         </p:nvSpPr>
         <p:spPr>
           <a:xfrm>
-            <a:off x="268144" y="1284426"/>
+            <a:off x="108599" y="1203598"/>
             <a:ext cx="8989362" cy="646331"/>
           </a:xfrm>
           <a:prstGeom prst="rect">
@@ -16351,13 +16253,13 @@
           <a:p>
             <a:r>
               <a:rPr lang="es-ES" dirty="0" smtClean="0"/>
-              <a:t>Si lo que desea es eliminar el proyecto desde Git, se dirige a la carpeta donde tiene </a:t>
+              <a:t>Si lo que desea es eliminar el proyecto local desde Git, se dirige a la carpeta donde </a:t>
             </a:r>
           </a:p>
           <a:p>
             <a:r>
               <a:rPr lang="es-ES" dirty="0" smtClean="0"/>
-              <a:t>el proyecto local y elimina la carpeta </a:t>
+              <a:t>tiene el proyecto y elimina la carpeta </a:t>
             </a:r>
             <a:r>
               <a:rPr lang="es-ES" b="1" dirty="0" smtClean="0"/>
@@ -16387,7 +16289,7 @@
         </p:blipFill>
         <p:spPr>
           <a:xfrm>
-            <a:off x="3059832" y="2443633"/>
+            <a:off x="2987824" y="2237354"/>
             <a:ext cx="2266950" cy="1019175"/>
           </a:xfrm>
           <a:prstGeom prst="rect">
@@ -16403,7 +16305,7 @@
     </p:spTree>
     <p:extLst>
       <p:ext uri="{BB962C8B-B14F-4D97-AF65-F5344CB8AC3E}">
-        <p14:creationId xmlns:p14="http://schemas.microsoft.com/office/powerpoint/2010/main" val="378441662"/>
+        <p14:creationId xmlns:p14="http://schemas.microsoft.com/office/powerpoint/2010/main" val="4289353426"/>
       </p:ext>
     </p:extLst>
   </p:cSld>
@@ -16527,21 +16429,21 @@
           <a:p>
             <a:r>
               <a:rPr lang="es-ES" dirty="0" smtClean="0"/>
-              <a:t>Si lo que desea es eliminar el proyecto local desde Git, se dirige a la carpeta donde </a:t>
-            </a:r>
-          </a:p>
-          <a:p>
+              <a:t>Sin embargo este repositorio continuará estando disponible en </a:t>
+            </a:r>
+            <a:r>
+              <a:rPr lang="es-ES" dirty="0" err="1" smtClean="0"/>
+              <a:t>gitHub</a:t>
+            </a:r>
             <a:r>
               <a:rPr lang="es-ES" dirty="0" smtClean="0"/>
-              <a:t>tiene el proyecto y elimina la carpeta </a:t>
-            </a:r>
-            <a:r>
-              <a:rPr lang="es-ES" b="1" dirty="0" smtClean="0"/>
-              <a:t>.</a:t>
-            </a:r>
-            <a:r>
-              <a:rPr lang="es-ES" b="1" dirty="0" err="1" smtClean="0"/>
-              <a:t>git</a:t>
+              <a:t>, por lo que si </a:t>
+            </a:r>
+          </a:p>
+          <a:p>
+            <a:r>
+              <a:rPr lang="es-ES" dirty="0" smtClean="0"/>
+              <a:t>desea eliminar este repositorio, se dirige a la parte inferior de la configuración.</a:t>
             </a:r>
             <a:endParaRPr lang="es-ES" b="1" dirty="0"/>
           </a:p>
@@ -16549,7 +16451,7 @@
       </p:sp>
       <p:pic>
         <p:nvPicPr>
-          <p:cNvPr id="3" name="Imagen 2"/>
+          <p:cNvPr id="5" name="Imagen 4"/>
           <p:cNvPicPr>
             <a:picLocks noChangeAspect="1"/>
           </p:cNvPicPr>
@@ -16563,8 +16465,8 @@
         </p:blipFill>
         <p:spPr>
           <a:xfrm>
-            <a:off x="2987824" y="2237354"/>
-            <a:ext cx="2266950" cy="1019175"/>
+            <a:off x="1012232" y="2513517"/>
+            <a:ext cx="7182096" cy="2361460"/>
           </a:xfrm>
           <a:prstGeom prst="rect">
             <a:avLst/>
@@ -16579,7 +16481,7 @@
     </p:spTree>
     <p:extLst>
       <p:ext uri="{BB962C8B-B14F-4D97-AF65-F5344CB8AC3E}">
-        <p14:creationId xmlns:p14="http://schemas.microsoft.com/office/powerpoint/2010/main" val="4289353426"/>
+        <p14:creationId xmlns:p14="http://schemas.microsoft.com/office/powerpoint/2010/main" val="3671200106"/>
       </p:ext>
     </p:extLst>
   </p:cSld>
@@ -16688,7 +16590,7 @@
         <p:spPr>
           <a:xfrm>
             <a:off x="108599" y="1203598"/>
-            <a:ext cx="8989362" cy="646331"/>
+            <a:ext cx="8989362" cy="369332"/>
           </a:xfrm>
           <a:prstGeom prst="rect">
             <a:avLst/>
@@ -16703,21 +16605,35 @@
           <a:p>
             <a:r>
               <a:rPr lang="es-ES" dirty="0" smtClean="0"/>
-              <a:t>Sin embargo este repositorio continuará estando disponible en </a:t>
-            </a:r>
-            <a:r>
-              <a:rPr lang="es-ES" dirty="0" err="1" smtClean="0"/>
-              <a:t>gitHub</a:t>
-            </a:r>
-            <a:r>
-              <a:rPr lang="es-ES" dirty="0" smtClean="0"/>
-              <a:t>, por lo que si </a:t>
-            </a:r>
-          </a:p>
-          <a:p>
-            <a:r>
-              <a:rPr lang="es-ES" dirty="0" smtClean="0"/>
-              <a:t>desea eliminar este repositorio, se dirige a la parte inferior de la configuración.</a:t>
+              <a:t>Y selecciona la opción </a:t>
+            </a:r>
+            <a:r>
+              <a:rPr lang="es-ES" b="1" dirty="0" err="1"/>
+              <a:t>D</a:t>
+            </a:r>
+            <a:r>
+              <a:rPr lang="es-ES" b="1" dirty="0" err="1" smtClean="0"/>
+              <a:t>elete</a:t>
+            </a:r>
+            <a:r>
+              <a:rPr lang="es-ES" b="1" dirty="0" smtClean="0"/>
+              <a:t> </a:t>
+            </a:r>
+            <a:r>
+              <a:rPr lang="es-ES" b="1" dirty="0" err="1" smtClean="0"/>
+              <a:t>this</a:t>
+            </a:r>
+            <a:r>
+              <a:rPr lang="es-ES" b="1" dirty="0" smtClean="0"/>
+              <a:t> </a:t>
+            </a:r>
+            <a:r>
+              <a:rPr lang="es-ES" b="1" dirty="0" err="1" smtClean="0"/>
+              <a:t>repository</a:t>
+            </a:r>
+            <a:r>
+              <a:rPr lang="es-ES" b="1" dirty="0" smtClean="0"/>
+              <a:t>.</a:t>
             </a:r>
             <a:endParaRPr lang="es-ES" b="1" dirty="0"/>
           </a:p>
@@ -16725,7 +16641,7 @@
       </p:sp>
       <p:pic>
         <p:nvPicPr>
-          <p:cNvPr id="5" name="Imagen 4"/>
+          <p:cNvPr id="3" name="Imagen 2"/>
           <p:cNvPicPr>
             <a:picLocks noChangeAspect="1"/>
           </p:cNvPicPr>
@@ -16739,8 +16655,8 @@
         </p:blipFill>
         <p:spPr>
           <a:xfrm>
-            <a:off x="1012232" y="2513517"/>
-            <a:ext cx="7182096" cy="2361460"/>
+            <a:off x="1222487" y="1906174"/>
+            <a:ext cx="5868516" cy="2798940"/>
           </a:xfrm>
           <a:prstGeom prst="rect">
             <a:avLst/>
@@ -16755,7 +16671,7 @@
     </p:spTree>
     <p:extLst>
       <p:ext uri="{BB962C8B-B14F-4D97-AF65-F5344CB8AC3E}">
-        <p14:creationId xmlns:p14="http://schemas.microsoft.com/office/powerpoint/2010/main" val="3671200106"/>
+        <p14:creationId xmlns:p14="http://schemas.microsoft.com/office/powerpoint/2010/main" val="3075060896"/>
       </p:ext>
     </p:extLst>
   </p:cSld>
@@ -16879,196 +16795,6 @@
           <a:p>
             <a:r>
               <a:rPr lang="es-ES" dirty="0" smtClean="0"/>
-              <a:t>Y selecciona la opción </a:t>
-            </a:r>
-            <a:r>
-              <a:rPr lang="es-ES" b="1" dirty="0" err="1"/>
-              <a:t>D</a:t>
-            </a:r>
-            <a:r>
-              <a:rPr lang="es-ES" b="1" dirty="0" err="1" smtClean="0"/>
-              <a:t>elete</a:t>
-            </a:r>
-            <a:r>
-              <a:rPr lang="es-ES" b="1" dirty="0" smtClean="0"/>
-              <a:t> </a:t>
-            </a:r>
-            <a:r>
-              <a:rPr lang="es-ES" b="1" dirty="0" err="1" smtClean="0"/>
-              <a:t>this</a:t>
-            </a:r>
-            <a:r>
-              <a:rPr lang="es-ES" b="1" dirty="0" smtClean="0"/>
-              <a:t> </a:t>
-            </a:r>
-            <a:r>
-              <a:rPr lang="es-ES" b="1" dirty="0" err="1" smtClean="0"/>
-              <a:t>repository</a:t>
-            </a:r>
-            <a:r>
-              <a:rPr lang="es-ES" b="1" dirty="0" smtClean="0"/>
-              <a:t>.</a:t>
-            </a:r>
-            <a:endParaRPr lang="es-ES" b="1" dirty="0"/>
-          </a:p>
-        </p:txBody>
-      </p:sp>
-      <p:pic>
-        <p:nvPicPr>
-          <p:cNvPr id="3" name="Imagen 2"/>
-          <p:cNvPicPr>
-            <a:picLocks noChangeAspect="1"/>
-          </p:cNvPicPr>
-          <p:nvPr/>
-        </p:nvPicPr>
-        <p:blipFill>
-          <a:blip r:embed="rId3"/>
-          <a:stretch>
-            <a:fillRect/>
-          </a:stretch>
-        </p:blipFill>
-        <p:spPr>
-          <a:xfrm>
-            <a:off x="1222487" y="1906174"/>
-            <a:ext cx="5868516" cy="2798940"/>
-          </a:xfrm>
-          <a:prstGeom prst="rect">
-            <a:avLst/>
-          </a:prstGeom>
-          <a:ln>
-            <a:solidFill>
-              <a:schemeClr val="tx1"/>
-            </a:solidFill>
-          </a:ln>
-        </p:spPr>
-      </p:pic>
-    </p:spTree>
-    <p:extLst>
-      <p:ext uri="{BB962C8B-B14F-4D97-AF65-F5344CB8AC3E}">
-        <p14:creationId xmlns:p14="http://schemas.microsoft.com/office/powerpoint/2010/main" val="3075060896"/>
-      </p:ext>
-    </p:extLst>
-  </p:cSld>
-  <p:clrMapOvr>
-    <a:masterClrMapping/>
-  </p:clrMapOvr>
-  <p:timing>
-    <p:tnLst>
-      <p:par>
-        <p:cTn id="1" dur="indefinite" restart="never" nodeType="tmRoot"/>
-      </p:par>
-    </p:tnLst>
-  </p:timing>
-</p:sld>
-</file>
-
-<file path=ppt/slides/slide36.xml><?xml version="1.0" encoding="utf-8"?>
-<p:sld xmlns:a="http://schemas.openxmlformats.org/drawingml/2006/main" xmlns:r="http://schemas.openxmlformats.org/officeDocument/2006/relationships" xmlns:p="http://schemas.openxmlformats.org/presentationml/2006/main">
-  <p:cSld>
-    <p:spTree>
-      <p:nvGrpSpPr>
-        <p:cNvPr id="1" name=""/>
-        <p:cNvGrpSpPr/>
-        <p:nvPr/>
-      </p:nvGrpSpPr>
-      <p:grpSpPr>
-        <a:xfrm>
-          <a:off x="0" y="0"/>
-          <a:ext cx="0" cy="0"/>
-          <a:chOff x="0" y="0"/>
-          <a:chExt cx="0" cy="0"/>
-        </a:xfrm>
-      </p:grpSpPr>
-      <p:sp>
-        <p:nvSpPr>
-          <p:cNvPr id="2" name="Text Placeholder 1"/>
-          <p:cNvSpPr>
-            <a:spLocks noGrp="1"/>
-          </p:cNvSpPr>
-          <p:nvPr>
-            <p:ph type="body" sz="quarter" idx="10"/>
-          </p:nvPr>
-        </p:nvSpPr>
-        <p:spPr>
-          <a:xfrm>
-            <a:off x="301202" y="195486"/>
-            <a:ext cx="7200800" cy="576064"/>
-          </a:xfrm>
-        </p:spPr>
-        <p:txBody>
-          <a:bodyPr/>
-          <a:lstStyle/>
-          <a:p>
-            <a:r>
-              <a:rPr lang="en-US" altLang="ko-KR" sz="2800" dirty="0" err="1" smtClean="0"/>
-              <a:t>Eliminar</a:t>
-            </a:r>
-            <a:r>
-              <a:rPr lang="en-US" altLang="ko-KR" sz="2800" dirty="0" smtClean="0"/>
-              <a:t> el proyecto Git</a:t>
-            </a:r>
-            <a:endParaRPr lang="ko-KR" altLang="en-US" sz="2800" dirty="0">
-              <a:solidFill>
-                <a:schemeClr val="accent1"/>
-              </a:solidFill>
-            </a:endParaRPr>
-          </a:p>
-        </p:txBody>
-      </p:sp>
-      <p:sp>
-        <p:nvSpPr>
-          <p:cNvPr id="4" name="CuadroTexto 3"/>
-          <p:cNvSpPr txBox="1"/>
-          <p:nvPr/>
-        </p:nvSpPr>
-        <p:spPr>
-          <a:xfrm>
-            <a:off x="8716315" y="4659982"/>
-            <a:ext cx="312906" cy="369332"/>
-          </a:xfrm>
-          <a:prstGeom prst="rect">
-            <a:avLst/>
-          </a:prstGeom>
-          <a:noFill/>
-        </p:spPr>
-        <p:txBody>
-          <a:bodyPr wrap="none" rtlCol="0">
-            <a:spAutoFit/>
-          </a:bodyPr>
-          <a:lstStyle/>
-          <a:p>
-            <a:fld id="{9E5BF957-7D44-4412-BB95-8FF8964EA64E}" type="slidenum">
-              <a:rPr lang="es-ES" smtClean="0"/>
-              <a:t>36</a:t>
-            </a:fld>
-            <a:endParaRPr lang="es-ES" dirty="0"/>
-          </a:p>
-        </p:txBody>
-      </p:sp>
-      <p:sp>
-        <p:nvSpPr>
-          <p:cNvPr id="9" name="CuadroTexto 8"/>
-          <p:cNvSpPr txBox="1"/>
-          <p:nvPr/>
-        </p:nvSpPr>
-        <p:spPr>
-          <a:xfrm>
-            <a:off x="108599" y="1203598"/>
-            <a:ext cx="8989362" cy="369332"/>
-          </a:xfrm>
-          <a:prstGeom prst="rect">
-            <a:avLst/>
-          </a:prstGeom>
-          <a:noFill/>
-        </p:spPr>
-        <p:txBody>
-          <a:bodyPr wrap="square" rtlCol="0">
-            <a:spAutoFit/>
-          </a:bodyPr>
-          <a:lstStyle/>
-          <a:p>
-            <a:r>
-              <a:rPr lang="es-ES" dirty="0" smtClean="0"/>
               <a:t>Mostrándose la siguiente ventana de confirmación.</a:t>
             </a:r>
             <a:endParaRPr lang="es-ES" b="1" dirty="0"/>
@@ -17124,7 +16850,7 @@
 </p:sld>
 </file>
 
-<file path=ppt/slides/slide37.xml><?xml version="1.0" encoding="utf-8"?>
+<file path=ppt/slides/slide36.xml><?xml version="1.0" encoding="utf-8"?>
 <p:sld xmlns:a="http://schemas.openxmlformats.org/drawingml/2006/main" xmlns:r="http://schemas.openxmlformats.org/officeDocument/2006/relationships" xmlns:p="http://schemas.openxmlformats.org/presentationml/2006/main">
   <p:cSld>
     <p:spTree>
@@ -18114,7 +17840,6 @@
               <a:rPr lang="es-ES" dirty="0"/>
               <a:t> mostrándose la siguiente página.</a:t>
             </a:r>
-            <a:endParaRPr lang="es-ES" dirty="0"/>
           </a:p>
         </p:txBody>
       </p:sp>

</xml_diff>